<commit_message>
Cleaning up the files
</commit_message>
<xml_diff>
--- a/powerpoint/Seattle911MLPresentation.pptx
+++ b/powerpoint/Seattle911MLPresentation.pptx
@@ -12697,7 +12697,7 @@
         </p:blipFill>
         <p:spPr>
           <a:xfrm>
-            <a:off x="1141410" y="2097087"/>
+            <a:off x="1132022" y="2256415"/>
             <a:ext cx="9915389" cy="1172585"/>
           </a:xfrm>
           <a:prstGeom prst="rect">
@@ -12729,8 +12729,38 @@
         </p:blipFill>
         <p:spPr>
           <a:xfrm>
-            <a:off x="550130" y="3734533"/>
+            <a:off x="622957" y="3742625"/>
             <a:ext cx="11226711" cy="1172585"/>
+          </a:xfrm>
+          <a:prstGeom prst="rect">
+            <a:avLst/>
+          </a:prstGeom>
+        </p:spPr>
+      </p:pic>
+      <p:pic>
+        <p:nvPicPr>
+          <p:cNvPr id="12" name="Picture 11">
+            <a:extLst>
+              <a:ext uri="{FF2B5EF4-FFF2-40B4-BE49-F238E27FC236}">
+                <a16:creationId xmlns:a16="http://schemas.microsoft.com/office/drawing/2014/main" id="{7A1B98F5-FD31-07E7-C5FA-3844EDF9B45A}"/>
+              </a:ext>
+            </a:extLst>
+          </p:cNvPr>
+          <p:cNvPicPr>
+            <a:picLocks noChangeAspect="1"/>
+          </p:cNvPicPr>
+          <p:nvPr/>
+        </p:nvPicPr>
+        <p:blipFill>
+          <a:blip r:embed="rId4"/>
+          <a:stretch>
+            <a:fillRect/>
+          </a:stretch>
+        </p:blipFill>
+        <p:spPr>
+          <a:xfrm>
+            <a:off x="2673013" y="5383001"/>
+            <a:ext cx="6311900" cy="558800"/>
           </a:xfrm>
           <a:prstGeom prst="rect">
             <a:avLst/>
@@ -12937,7 +12967,7 @@
         </p:blipFill>
         <p:spPr>
           <a:xfrm>
-            <a:off x="374736" y="3228589"/>
+            <a:off x="768397" y="2681742"/>
             <a:ext cx="5719676" cy="3409688"/>
           </a:xfrm>
           <a:prstGeom prst="rect">
@@ -12967,7 +12997,7 @@
         </p:blipFill>
         <p:spPr>
           <a:xfrm>
-            <a:off x="7205252" y="3228589"/>
+            <a:off x="6990099" y="3219624"/>
             <a:ext cx="4218351" cy="3318277"/>
           </a:xfrm>
           <a:prstGeom prst="rect">
@@ -12997,7 +13027,7 @@
         </p:blipFill>
         <p:spPr>
           <a:xfrm>
-            <a:off x="8082939" y="227013"/>
+            <a:off x="7428942" y="164261"/>
             <a:ext cx="3340664" cy="2910166"/>
           </a:xfrm>
           <a:prstGeom prst="rect">
@@ -13173,8 +13203,38 @@
         </p:blipFill>
         <p:spPr>
           <a:xfrm>
-            <a:off x="4903317" y="3792606"/>
-            <a:ext cx="5682847" cy="2259107"/>
+            <a:off x="5457034" y="3866481"/>
+            <a:ext cx="4499935" cy="1788863"/>
+          </a:xfrm>
+          <a:prstGeom prst="rect">
+            <a:avLst/>
+          </a:prstGeom>
+        </p:spPr>
+      </p:pic>
+      <p:pic>
+        <p:nvPicPr>
+          <p:cNvPr id="7" name="Picture 6">
+            <a:extLst>
+              <a:ext uri="{FF2B5EF4-FFF2-40B4-BE49-F238E27FC236}">
+                <a16:creationId xmlns:a16="http://schemas.microsoft.com/office/drawing/2014/main" id="{265AFE8C-6A1B-55EA-202B-6A23D76CE833}"/>
+              </a:ext>
+            </a:extLst>
+          </p:cNvPr>
+          <p:cNvPicPr>
+            <a:picLocks noChangeAspect="1"/>
+          </p:cNvPicPr>
+          <p:nvPr/>
+        </p:nvPicPr>
+        <p:blipFill>
+          <a:blip r:embed="rId3"/>
+          <a:stretch>
+            <a:fillRect/>
+          </a:stretch>
+        </p:blipFill>
+        <p:spPr>
+          <a:xfrm>
+            <a:off x="4618354" y="5768484"/>
+            <a:ext cx="6311900" cy="558800"/>
           </a:xfrm>
           <a:prstGeom prst="rect">
             <a:avLst/>

</xml_diff>

<commit_message>
Final clean up and presentation updated
</commit_message>
<xml_diff>
--- a/powerpoint/Seattle911MLPresentation.pptx
+++ b/powerpoint/Seattle911MLPresentation.pptx
@@ -10,8 +10,9 @@
     <p:sldId id="257" r:id="rId4"/>
     <p:sldId id="258" r:id="rId5"/>
     <p:sldId id="260" r:id="rId6"/>
-    <p:sldId id="261" r:id="rId7"/>
-    <p:sldId id="262" r:id="rId8"/>
+    <p:sldId id="263" r:id="rId7"/>
+    <p:sldId id="261" r:id="rId8"/>
+    <p:sldId id="262" r:id="rId9"/>
   </p:sldIdLst>
   <p:sldSz cx="12192000" cy="6858000"/>
   <p:notesSz cx="6858000" cy="9144000"/>
@@ -12922,6 +12923,96 @@
           <p:cNvPr id="2" name="Title 1">
             <a:extLst>
               <a:ext uri="{FF2B5EF4-FFF2-40B4-BE49-F238E27FC236}">
+                <a16:creationId xmlns:a16="http://schemas.microsoft.com/office/drawing/2014/main" id="{C7CAA99A-6A2C-7BE2-C235-79EA797C4FBE}"/>
+              </a:ext>
+            </a:extLst>
+          </p:cNvPr>
+          <p:cNvSpPr>
+            <a:spLocks noGrp="1"/>
+          </p:cNvSpPr>
+          <p:nvPr>
+            <p:ph type="title"/>
+          </p:nvPr>
+        </p:nvSpPr>
+        <p:spPr/>
+        <p:txBody>
+          <a:bodyPr/>
+          <a:lstStyle/>
+          <a:p>
+            <a:r>
+              <a:rPr lang="en-US" cap="none" dirty="0"/>
+              <a:t>Top event by time of day</a:t>
+            </a:r>
+          </a:p>
+        </p:txBody>
+      </p:sp>
+      <p:pic>
+        <p:nvPicPr>
+          <p:cNvPr id="4" name="Content Placeholder 3">
+            <a:extLst>
+              <a:ext uri="{FF2B5EF4-FFF2-40B4-BE49-F238E27FC236}">
+                <a16:creationId xmlns:a16="http://schemas.microsoft.com/office/drawing/2014/main" id="{1DEF7BB9-D831-B117-E9AD-A88770A9A19C}"/>
+              </a:ext>
+            </a:extLst>
+          </p:cNvPr>
+          <p:cNvPicPr>
+            <a:picLocks noGrp="1" noChangeAspect="1"/>
+          </p:cNvPicPr>
+          <p:nvPr>
+            <p:ph idx="1"/>
+          </p:nvPr>
+        </p:nvPicPr>
+        <p:blipFill>
+          <a:blip r:embed="rId2"/>
+          <a:stretch>
+            <a:fillRect/>
+          </a:stretch>
+        </p:blipFill>
+        <p:spPr>
+          <a:xfrm>
+            <a:off x="2096374" y="1971581"/>
+            <a:ext cx="7576544" cy="4338407"/>
+          </a:xfrm>
+          <a:prstGeom prst="rect">
+            <a:avLst/>
+          </a:prstGeom>
+        </p:spPr>
+      </p:pic>
+    </p:spTree>
+    <p:extLst>
+      <p:ext uri="{BB962C8B-B14F-4D97-AF65-F5344CB8AC3E}">
+        <p14:creationId xmlns:p14="http://schemas.microsoft.com/office/powerpoint/2010/main" val="1493999331"/>
+      </p:ext>
+    </p:extLst>
+  </p:cSld>
+  <p:clrMapOvr>
+    <a:masterClrMapping/>
+  </p:clrMapOvr>
+</p:sld>
+</file>
+
+<file path=ppt/slides/slide7.xml><?xml version="1.0" encoding="utf-8"?>
+<p:sld xmlns:a="http://schemas.openxmlformats.org/drawingml/2006/main" xmlns:r="http://schemas.openxmlformats.org/officeDocument/2006/relationships" xmlns:p="http://schemas.openxmlformats.org/presentationml/2006/main">
+  <p:cSld>
+    <p:spTree>
+      <p:nvGrpSpPr>
+        <p:cNvPr id="1" name=""/>
+        <p:cNvGrpSpPr/>
+        <p:nvPr/>
+      </p:nvGrpSpPr>
+      <p:grpSpPr>
+        <a:xfrm>
+          <a:off x="0" y="0"/>
+          <a:ext cx="0" cy="0"/>
+          <a:chOff x="0" y="0"/>
+          <a:chExt cx="0" cy="0"/>
+        </a:xfrm>
+      </p:grpSpPr>
+      <p:sp>
+        <p:nvSpPr>
+          <p:cNvPr id="2" name="Title 1">
+            <a:extLst>
+              <a:ext uri="{FF2B5EF4-FFF2-40B4-BE49-F238E27FC236}">
                 <a16:creationId xmlns:a16="http://schemas.microsoft.com/office/drawing/2014/main" id="{F2D7CA1D-6878-8B95-E136-D205450BF2E6}"/>
               </a:ext>
             </a:extLst>
@@ -13048,7 +13139,7 @@
 </p:sld>
 </file>
 
-<file path=ppt/slides/slide7.xml><?xml version="1.0" encoding="utf-8"?>
+<file path=ppt/slides/slide8.xml><?xml version="1.0" encoding="utf-8"?>
 <p:sld xmlns:a="http://schemas.openxmlformats.org/drawingml/2006/main" xmlns:r="http://schemas.openxmlformats.org/officeDocument/2006/relationships" xmlns:p="http://schemas.openxmlformats.org/presentationml/2006/main">
   <p:cSld>
     <p:spTree>

</xml_diff>